<commit_message>
changed the template a little bit
</commit_message>
<xml_diff>
--- a/week02/Lecture02.pptx
+++ b/week02/Lecture02.pptx
@@ -3641,7 +3641,7 @@
           <a:p>
             <a:fld id="{FC19A4FA-3D9A-4114-B0D5-759CBD56F1AB}" type="datetimeFigureOut">
               <a:rPr lang="zh-CN" altLang="en-US" smtClean="0"/>
-              <a:t>2021/9/8</a:t>
+              <a:t>2021/9/9</a:t>
             </a:fld>
             <a:endParaRPr lang="zh-CN" altLang="en-US"/>
           </a:p>
@@ -3716,7 +3716,7 @@
         </p:blipFill>
         <p:spPr>
           <a:xfrm>
-            <a:off x="8610600" y="0"/>
+            <a:off x="65507" y="0"/>
             <a:ext cx="3515893" cy="1007930"/>
           </a:xfrm>
           <a:prstGeom prst="rect">
@@ -3844,7 +3844,7 @@
           <a:p>
             <a:fld id="{FC19A4FA-3D9A-4114-B0D5-759CBD56F1AB}" type="datetimeFigureOut">
               <a:rPr lang="zh-CN" altLang="en-US" smtClean="0"/>
-              <a:t>2021/9/8</a:t>
+              <a:t>2021/9/9</a:t>
             </a:fld>
             <a:endParaRPr lang="zh-CN" altLang="en-US"/>
           </a:p>
@@ -4022,7 +4022,7 @@
           <a:p>
             <a:fld id="{FC19A4FA-3D9A-4114-B0D5-759CBD56F1AB}" type="datetimeFigureOut">
               <a:rPr lang="zh-CN" altLang="en-US" smtClean="0"/>
-              <a:t>2021/9/8</a:t>
+              <a:t>2021/9/9</a:t>
             </a:fld>
             <a:endParaRPr lang="zh-CN" altLang="en-US"/>
           </a:p>
@@ -4100,6 +4100,41 @@
           <a:chExt cx="0" cy="0"/>
         </a:xfrm>
       </p:grpSpPr>
+      <p:pic>
+        <p:nvPicPr>
+          <p:cNvPr id="8" name="图片 7">
+            <a:extLst>
+              <a:ext uri="{FF2B5EF4-FFF2-40B4-BE49-F238E27FC236}">
+                <a16:creationId xmlns:a16="http://schemas.microsoft.com/office/drawing/2014/main" id="{50B810D5-562C-6D40-A798-62FEF5ACFC23}"/>
+              </a:ext>
+            </a:extLst>
+          </p:cNvPr>
+          <p:cNvPicPr>
+            <a:picLocks noChangeAspect="1"/>
+          </p:cNvPicPr>
+          <p:nvPr userDrawn="1"/>
+        </p:nvPicPr>
+        <p:blipFill rotWithShape="1">
+          <a:blip r:embed="rId2" cstate="print">
+            <a:extLst>
+              <a:ext uri="{28A0092B-C50C-407E-A947-70E740481C1C}">
+                <a14:useLocalDpi xmlns:a14="http://schemas.microsoft.com/office/drawing/2010/main" val="0"/>
+              </a:ext>
+            </a:extLst>
+          </a:blip>
+          <a:srcRect l="24618" t="38788" r="61357" b="40606"/>
+          <a:stretch/>
+        </p:blipFill>
+        <p:spPr>
+          <a:xfrm>
+            <a:off x="65507" y="0"/>
+            <a:ext cx="970813" cy="1007930"/>
+          </a:xfrm>
+          <a:prstGeom prst="rect">
+            <a:avLst/>
+          </a:prstGeom>
+        </p:spPr>
+      </p:pic>
       <p:sp>
         <p:nvSpPr>
           <p:cNvPr id="2" name="标题 1"/>
@@ -4211,7 +4246,7 @@
           <a:p>
             <a:fld id="{FC19A4FA-3D9A-4114-B0D5-759CBD56F1AB}" type="datetimeFigureOut">
               <a:rPr lang="zh-CN" altLang="en-US" smtClean="0"/>
-              <a:t>2021/9/8</a:t>
+              <a:t>2021/9/9</a:t>
             </a:fld>
             <a:endParaRPr lang="zh-CN" altLang="en-US"/>
           </a:p>
@@ -4259,36 +4294,6 @@
           </a:p>
         </p:txBody>
       </p:sp>
-      <p:pic>
-        <p:nvPicPr>
-          <p:cNvPr id="7" name="图片 6"/>
-          <p:cNvPicPr>
-            <a:picLocks/>
-          </p:cNvPicPr>
-          <p:nvPr userDrawn="1"/>
-        </p:nvPicPr>
-        <p:blipFill>
-          <a:blip r:embed="rId2" cstate="print">
-            <a:extLst>
-              <a:ext uri="{28A0092B-C50C-407E-A947-70E740481C1C}">
-                <a14:useLocalDpi xmlns:a14="http://schemas.microsoft.com/office/drawing/2010/main" val="0"/>
-              </a:ext>
-            </a:extLst>
-          </a:blip>
-          <a:stretch>
-            <a:fillRect/>
-          </a:stretch>
-        </p:blipFill>
-        <p:spPr>
-          <a:xfrm>
-            <a:off x="113370" y="69174"/>
-            <a:ext cx="1112400" cy="1111682"/>
-          </a:xfrm>
-          <a:prstGeom prst="rect">
-            <a:avLst/>
-          </a:prstGeom>
-        </p:spPr>
-      </p:pic>
     </p:spTree>
     <p:extLst>
       <p:ext uri="{BB962C8B-B14F-4D97-AF65-F5344CB8AC3E}">
@@ -4475,7 +4480,7 @@
           <a:p>
             <a:fld id="{FC19A4FA-3D9A-4114-B0D5-759CBD56F1AB}" type="datetimeFigureOut">
               <a:rPr lang="zh-CN" altLang="en-US" smtClean="0"/>
-              <a:t>2021/9/8</a:t>
+              <a:t>2021/9/9</a:t>
             </a:fld>
             <a:endParaRPr lang="zh-CN" altLang="en-US"/>
           </a:p>
@@ -4525,13 +4530,19 @@
       </p:sp>
       <p:pic>
         <p:nvPicPr>
-          <p:cNvPr id="8" name="图片 7"/>
+          <p:cNvPr id="9" name="图片 8">
+            <a:extLst>
+              <a:ext uri="{FF2B5EF4-FFF2-40B4-BE49-F238E27FC236}">
+                <a16:creationId xmlns:a16="http://schemas.microsoft.com/office/drawing/2014/main" id="{8BBC21BE-914F-984C-819E-13DA00BEE2DF}"/>
+              </a:ext>
+            </a:extLst>
+          </p:cNvPr>
           <p:cNvPicPr>
             <a:picLocks noChangeAspect="1"/>
           </p:cNvPicPr>
           <p:nvPr userDrawn="1"/>
         </p:nvPicPr>
-        <p:blipFill>
+        <p:blipFill rotWithShape="1">
           <a:blip r:embed="rId2" cstate="print">
             <a:extLst>
               <a:ext uri="{28A0092B-C50C-407E-A947-70E740481C1C}">
@@ -4539,14 +4550,13 @@
               </a:ext>
             </a:extLst>
           </a:blip>
-          <a:stretch>
-            <a:fillRect/>
-          </a:stretch>
+          <a:srcRect l="24618" t="38788" r="61357" b="40606"/>
+          <a:stretch/>
         </p:blipFill>
         <p:spPr>
           <a:xfrm>
-            <a:off x="838200" y="469724"/>
-            <a:ext cx="1097495" cy="1111171"/>
+            <a:off x="65507" y="0"/>
+            <a:ext cx="970813" cy="1007930"/>
           </a:xfrm>
           <a:prstGeom prst="rect">
             <a:avLst/>
@@ -4869,7 +4879,7 @@
           <a:p>
             <a:fld id="{FC19A4FA-3D9A-4114-B0D5-759CBD56F1AB}" type="datetimeFigureOut">
               <a:rPr lang="zh-CN" altLang="en-US" smtClean="0"/>
-              <a:t>2021/9/8</a:t>
+              <a:t>2021/9/9</a:t>
             </a:fld>
             <a:endParaRPr lang="zh-CN" altLang="en-US"/>
           </a:p>
@@ -4919,13 +4929,19 @@
       </p:sp>
       <p:pic>
         <p:nvPicPr>
-          <p:cNvPr id="10" name="图片 9"/>
+          <p:cNvPr id="11" name="图片 10">
+            <a:extLst>
+              <a:ext uri="{FF2B5EF4-FFF2-40B4-BE49-F238E27FC236}">
+                <a16:creationId xmlns:a16="http://schemas.microsoft.com/office/drawing/2014/main" id="{94EF34E2-55C5-FE4B-9D4B-1C371C023E40}"/>
+              </a:ext>
+            </a:extLst>
+          </p:cNvPr>
           <p:cNvPicPr>
             <a:picLocks noChangeAspect="1"/>
           </p:cNvPicPr>
           <p:nvPr userDrawn="1"/>
         </p:nvPicPr>
-        <p:blipFill>
+        <p:blipFill rotWithShape="1">
           <a:blip r:embed="rId2" cstate="print">
             <a:extLst>
               <a:ext uri="{28A0092B-C50C-407E-A947-70E740481C1C}">
@@ -4933,14 +4949,13 @@
               </a:ext>
             </a:extLst>
           </a:blip>
-          <a:stretch>
-            <a:fillRect/>
-          </a:stretch>
+          <a:srcRect l="24618" t="38788" r="61357" b="40606"/>
+          <a:stretch/>
         </p:blipFill>
         <p:spPr>
           <a:xfrm>
-            <a:off x="838200" y="469724"/>
-            <a:ext cx="1097495" cy="1111171"/>
+            <a:off x="65507" y="0"/>
+            <a:ext cx="970813" cy="1007930"/>
           </a:xfrm>
           <a:prstGeom prst="rect">
             <a:avLst/>
@@ -5144,7 +5159,7 @@
           <a:p>
             <a:fld id="{FC19A4FA-3D9A-4114-B0D5-759CBD56F1AB}" type="datetimeFigureOut">
               <a:rPr lang="zh-CN" altLang="en-US" smtClean="0"/>
-              <a:t>2021/9/8</a:t>
+              <a:t>2021/9/9</a:t>
             </a:fld>
             <a:endParaRPr lang="zh-CN" altLang="en-US"/>
           </a:p>
@@ -5192,6 +5207,41 @@
           </a:p>
         </p:txBody>
       </p:sp>
+      <p:pic>
+        <p:nvPicPr>
+          <p:cNvPr id="7" name="图片 6">
+            <a:extLst>
+              <a:ext uri="{FF2B5EF4-FFF2-40B4-BE49-F238E27FC236}">
+                <a16:creationId xmlns:a16="http://schemas.microsoft.com/office/drawing/2014/main" id="{AC6DD9DA-D04B-234F-AF7F-359B1655B794}"/>
+              </a:ext>
+            </a:extLst>
+          </p:cNvPr>
+          <p:cNvPicPr>
+            <a:picLocks noChangeAspect="1"/>
+          </p:cNvPicPr>
+          <p:nvPr userDrawn="1"/>
+        </p:nvPicPr>
+        <p:blipFill rotWithShape="1">
+          <a:blip r:embed="rId2" cstate="print">
+            <a:extLst>
+              <a:ext uri="{28A0092B-C50C-407E-A947-70E740481C1C}">
+                <a14:useLocalDpi xmlns:a14="http://schemas.microsoft.com/office/drawing/2010/main" val="0"/>
+              </a:ext>
+            </a:extLst>
+          </a:blip>
+          <a:srcRect l="24618" t="38788" r="61357" b="40606"/>
+          <a:stretch/>
+        </p:blipFill>
+        <p:spPr>
+          <a:xfrm>
+            <a:off x="65507" y="0"/>
+            <a:ext cx="970813" cy="1007930"/>
+          </a:xfrm>
+          <a:prstGeom prst="rect">
+            <a:avLst/>
+          </a:prstGeom>
+        </p:spPr>
+      </p:pic>
     </p:spTree>
     <p:extLst>
       <p:ext uri="{BB962C8B-B14F-4D97-AF65-F5344CB8AC3E}">
@@ -5261,7 +5311,7 @@
           <a:p>
             <a:fld id="{FC19A4FA-3D9A-4114-B0D5-759CBD56F1AB}" type="datetimeFigureOut">
               <a:rPr lang="zh-CN" altLang="en-US" smtClean="0"/>
-              <a:t>2021/9/8</a:t>
+              <a:t>2021/9/9</a:t>
             </a:fld>
             <a:endParaRPr lang="zh-CN" altLang="en-US"/>
           </a:p>
@@ -5309,6 +5359,41 @@
           </a:p>
         </p:txBody>
       </p:sp>
+      <p:pic>
+        <p:nvPicPr>
+          <p:cNvPr id="6" name="图片 5">
+            <a:extLst>
+              <a:ext uri="{FF2B5EF4-FFF2-40B4-BE49-F238E27FC236}">
+                <a16:creationId xmlns:a16="http://schemas.microsoft.com/office/drawing/2014/main" id="{8A27BA66-27EF-F848-B5D4-C6E63ED6969F}"/>
+              </a:ext>
+            </a:extLst>
+          </p:cNvPr>
+          <p:cNvPicPr>
+            <a:picLocks noChangeAspect="1"/>
+          </p:cNvPicPr>
+          <p:nvPr userDrawn="1"/>
+        </p:nvPicPr>
+        <p:blipFill rotWithShape="1">
+          <a:blip r:embed="rId2" cstate="print">
+            <a:extLst>
+              <a:ext uri="{28A0092B-C50C-407E-A947-70E740481C1C}">
+                <a14:useLocalDpi xmlns:a14="http://schemas.microsoft.com/office/drawing/2010/main" val="0"/>
+              </a:ext>
+            </a:extLst>
+          </a:blip>
+          <a:srcRect l="24618" t="38788" r="61357" b="40606"/>
+          <a:stretch/>
+        </p:blipFill>
+        <p:spPr>
+          <a:xfrm>
+            <a:off x="65507" y="0"/>
+            <a:ext cx="970813" cy="1007930"/>
+          </a:xfrm>
+          <a:prstGeom prst="rect">
+            <a:avLst/>
+          </a:prstGeom>
+        </p:spPr>
+      </p:pic>
     </p:spTree>
     <p:extLst>
       <p:ext uri="{BB962C8B-B14F-4D97-AF65-F5344CB8AC3E}">
@@ -5356,7 +5441,7 @@
           <a:p>
             <a:fld id="{FC19A4FA-3D9A-4114-B0D5-759CBD56F1AB}" type="datetimeFigureOut">
               <a:rPr lang="zh-CN" altLang="en-US" smtClean="0"/>
-              <a:t>2021/9/8</a:t>
+              <a:t>2021/9/9</a:t>
             </a:fld>
             <a:endParaRPr lang="zh-CN" altLang="en-US"/>
           </a:p>
@@ -5404,6 +5489,41 @@
           </a:p>
         </p:txBody>
       </p:sp>
+      <p:pic>
+        <p:nvPicPr>
+          <p:cNvPr id="5" name="图片 4">
+            <a:extLst>
+              <a:ext uri="{FF2B5EF4-FFF2-40B4-BE49-F238E27FC236}">
+                <a16:creationId xmlns:a16="http://schemas.microsoft.com/office/drawing/2014/main" id="{60094918-5C39-5840-99AC-03CB479DEC0B}"/>
+              </a:ext>
+            </a:extLst>
+          </p:cNvPr>
+          <p:cNvPicPr>
+            <a:picLocks noChangeAspect="1"/>
+          </p:cNvPicPr>
+          <p:nvPr userDrawn="1"/>
+        </p:nvPicPr>
+        <p:blipFill rotWithShape="1">
+          <a:blip r:embed="rId2" cstate="print">
+            <a:extLst>
+              <a:ext uri="{28A0092B-C50C-407E-A947-70E740481C1C}">
+                <a14:useLocalDpi xmlns:a14="http://schemas.microsoft.com/office/drawing/2010/main" val="0"/>
+              </a:ext>
+            </a:extLst>
+          </a:blip>
+          <a:srcRect l="24618" t="38788" r="61357" b="40606"/>
+          <a:stretch/>
+        </p:blipFill>
+        <p:spPr>
+          <a:xfrm>
+            <a:off x="65507" y="0"/>
+            <a:ext cx="970813" cy="1007930"/>
+          </a:xfrm>
+          <a:prstGeom prst="rect">
+            <a:avLst/>
+          </a:prstGeom>
+        </p:spPr>
+      </p:pic>
     </p:spTree>
     <p:extLst>
       <p:ext uri="{BB962C8B-B14F-4D97-AF65-F5344CB8AC3E}">
@@ -5631,7 +5751,7 @@
           <a:p>
             <a:fld id="{FC19A4FA-3D9A-4114-B0D5-759CBD56F1AB}" type="datetimeFigureOut">
               <a:rPr lang="zh-CN" altLang="en-US" smtClean="0"/>
-              <a:t>2021/9/8</a:t>
+              <a:t>2021/9/9</a:t>
             </a:fld>
             <a:endParaRPr lang="zh-CN" altLang="en-US"/>
           </a:p>
@@ -5679,6 +5799,41 @@
           </a:p>
         </p:txBody>
       </p:sp>
+      <p:pic>
+        <p:nvPicPr>
+          <p:cNvPr id="8" name="图片 7">
+            <a:extLst>
+              <a:ext uri="{FF2B5EF4-FFF2-40B4-BE49-F238E27FC236}">
+                <a16:creationId xmlns:a16="http://schemas.microsoft.com/office/drawing/2014/main" id="{071DD87C-9BE8-504F-A482-28FE7FDABCD9}"/>
+              </a:ext>
+            </a:extLst>
+          </p:cNvPr>
+          <p:cNvPicPr>
+            <a:picLocks noChangeAspect="1"/>
+          </p:cNvPicPr>
+          <p:nvPr userDrawn="1"/>
+        </p:nvPicPr>
+        <p:blipFill rotWithShape="1">
+          <a:blip r:embed="rId2" cstate="print">
+            <a:extLst>
+              <a:ext uri="{28A0092B-C50C-407E-A947-70E740481C1C}">
+                <a14:useLocalDpi xmlns:a14="http://schemas.microsoft.com/office/drawing/2010/main" val="0"/>
+              </a:ext>
+            </a:extLst>
+          </a:blip>
+          <a:srcRect l="24618" t="38788" r="61357" b="40606"/>
+          <a:stretch/>
+        </p:blipFill>
+        <p:spPr>
+          <a:xfrm>
+            <a:off x="65507" y="0"/>
+            <a:ext cx="970813" cy="1007930"/>
+          </a:xfrm>
+          <a:prstGeom prst="rect">
+            <a:avLst/>
+          </a:prstGeom>
+        </p:spPr>
+      </p:pic>
     </p:spTree>
     <p:extLst>
       <p:ext uri="{BB962C8B-B14F-4D97-AF65-F5344CB8AC3E}">
@@ -5883,7 +6038,7 @@
           <a:p>
             <a:fld id="{FC19A4FA-3D9A-4114-B0D5-759CBD56F1AB}" type="datetimeFigureOut">
               <a:rPr lang="zh-CN" altLang="en-US" smtClean="0"/>
-              <a:t>2021/9/8</a:t>
+              <a:t>2021/9/9</a:t>
             </a:fld>
             <a:endParaRPr lang="zh-CN" altLang="en-US"/>
           </a:p>
@@ -5931,6 +6086,41 @@
           </a:p>
         </p:txBody>
       </p:sp>
+      <p:pic>
+        <p:nvPicPr>
+          <p:cNvPr id="8" name="图片 7">
+            <a:extLst>
+              <a:ext uri="{FF2B5EF4-FFF2-40B4-BE49-F238E27FC236}">
+                <a16:creationId xmlns:a16="http://schemas.microsoft.com/office/drawing/2014/main" id="{B4FF3E64-915C-7F40-AA27-6031D114BFB0}"/>
+              </a:ext>
+            </a:extLst>
+          </p:cNvPr>
+          <p:cNvPicPr>
+            <a:picLocks noChangeAspect="1"/>
+          </p:cNvPicPr>
+          <p:nvPr userDrawn="1"/>
+        </p:nvPicPr>
+        <p:blipFill rotWithShape="1">
+          <a:blip r:embed="rId2" cstate="print">
+            <a:extLst>
+              <a:ext uri="{28A0092B-C50C-407E-A947-70E740481C1C}">
+                <a14:useLocalDpi xmlns:a14="http://schemas.microsoft.com/office/drawing/2010/main" val="0"/>
+              </a:ext>
+            </a:extLst>
+          </a:blip>
+          <a:srcRect l="24618" t="38788" r="61357" b="40606"/>
+          <a:stretch/>
+        </p:blipFill>
+        <p:spPr>
+          <a:xfrm>
+            <a:off x="65507" y="0"/>
+            <a:ext cx="970813" cy="1007930"/>
+          </a:xfrm>
+          <a:prstGeom prst="rect">
+            <a:avLst/>
+          </a:prstGeom>
+        </p:spPr>
+      </p:pic>
     </p:spTree>
     <p:extLst>
       <p:ext uri="{BB962C8B-B14F-4D97-AF65-F5344CB8AC3E}">
@@ -6141,7 +6331,7 @@
           <a:p>
             <a:fld id="{FC19A4FA-3D9A-4114-B0D5-759CBD56F1AB}" type="datetimeFigureOut">
               <a:rPr lang="zh-CN" altLang="en-US" smtClean="0"/>
-              <a:t>2021/9/8</a:t>
+              <a:t>2021/9/9</a:t>
             </a:fld>
             <a:endParaRPr lang="zh-CN" altLang="en-US"/>
           </a:p>

</xml_diff>